<commit_message>
adding update to the Documentation
</commit_message>
<xml_diff>
--- a/Documentation/QuickToolsScript_Schema.pptx
+++ b/Documentation/QuickToolsScript_Schema.pptx
@@ -7,7 +7,8 @@
   <p:sldIdLst>
     <p:sldId id="256" r:id="rId2"/>
     <p:sldId id="257" r:id="rId3"/>
-    <p:sldId id="258" r:id="rId4"/>
+    <p:sldId id="259" r:id="rId4"/>
+    <p:sldId id="258" r:id="rId5"/>
   </p:sldIdLst>
   <p:sldSz cx="9144000" cy="6858000" type="screen4x3"/>
   <p:notesSz cx="9144000" cy="6858000"/>
@@ -3703,7 +3704,6 @@
               <a:rPr lang="en-US" sz="1400" dirty="0" smtClean="0"/>
               <a:t>Menu Select Option</a:t>
             </a:r>
-            <a:endParaRPr lang="en-US" sz="1400" dirty="0" smtClean="0"/>
           </a:p>
         </p:txBody>
       </p:sp>
@@ -5586,6 +5586,122 @@
           </a:fontRef>
         </p:style>
       </p:cxnSp>
+      <p:sp>
+        <p:nvSpPr>
+          <p:cNvPr id="5" name="4 CuadroTexto"/>
+          <p:cNvSpPr txBox="1"/>
+          <p:nvPr/>
+        </p:nvSpPr>
+        <p:spPr>
+          <a:xfrm>
+            <a:off x="762000" y="4941332"/>
+            <a:ext cx="1320529" cy="369332"/>
+          </a:xfrm>
+          <a:prstGeom prst="rect">
+            <a:avLst/>
+          </a:prstGeom>
+          <a:noFill/>
+          <a:ln>
+            <a:solidFill>
+              <a:schemeClr val="tx1"/>
+            </a:solidFill>
+          </a:ln>
+        </p:spPr>
+        <p:txBody>
+          <a:bodyPr wrap="square" rtlCol="0">
+            <a:spAutoFit/>
+          </a:bodyPr>
+          <a:lstStyle/>
+          <a:p>
+            <a:pPr algn="ctr"/>
+            <a:r>
+              <a:rPr lang="en-US" dirty="0"/>
+              <a:t>Phase</a:t>
+            </a:r>
+            <a:r>
+              <a:rPr lang="en-US" dirty="0" smtClean="0"/>
+              <a:t> A</a:t>
+            </a:r>
+            <a:endParaRPr lang="en-US" dirty="0"/>
+          </a:p>
+        </p:txBody>
+      </p:sp>
+      <p:sp>
+        <p:nvSpPr>
+          <p:cNvPr id="36" name="35 CuadroTexto"/>
+          <p:cNvSpPr txBox="1"/>
+          <p:nvPr/>
+        </p:nvSpPr>
+        <p:spPr>
+          <a:xfrm>
+            <a:off x="4026035" y="1951395"/>
+            <a:ext cx="1320529" cy="369332"/>
+          </a:xfrm>
+          <a:prstGeom prst="rect">
+            <a:avLst/>
+          </a:prstGeom>
+          <a:noFill/>
+          <a:ln>
+            <a:solidFill>
+              <a:schemeClr val="tx1">
+                <a:lumMod val="95000"/>
+              </a:schemeClr>
+            </a:solidFill>
+          </a:ln>
+        </p:spPr>
+        <p:txBody>
+          <a:bodyPr wrap="square" rtlCol="0">
+            <a:spAutoFit/>
+          </a:bodyPr>
+          <a:lstStyle/>
+          <a:p>
+            <a:pPr algn="ctr"/>
+            <a:r>
+              <a:rPr lang="en-US" dirty="0" smtClean="0"/>
+              <a:t>Phase B</a:t>
+            </a:r>
+            <a:endParaRPr lang="en-US" dirty="0"/>
+          </a:p>
+        </p:txBody>
+      </p:sp>
+      <p:sp>
+        <p:nvSpPr>
+          <p:cNvPr id="37" name="36 CuadroTexto"/>
+          <p:cNvSpPr txBox="1"/>
+          <p:nvPr/>
+        </p:nvSpPr>
+        <p:spPr>
+          <a:xfrm>
+            <a:off x="6890021" y="276397"/>
+            <a:ext cx="1320529" cy="369332"/>
+          </a:xfrm>
+          <a:prstGeom prst="rect">
+            <a:avLst/>
+          </a:prstGeom>
+          <a:noFill/>
+          <a:ln>
+            <a:solidFill>
+              <a:schemeClr val="tx1">
+                <a:lumMod val="95000"/>
+              </a:schemeClr>
+            </a:solidFill>
+          </a:ln>
+        </p:spPr>
+        <p:txBody>
+          <a:bodyPr wrap="square" rtlCol="0">
+            <a:spAutoFit/>
+          </a:bodyPr>
+          <a:lstStyle/>
+          <a:p>
+            <a:pPr algn="ctr"/>
+            <a:r>
+              <a:rPr lang="en-US" dirty="0" smtClean="0"/>
+              <a:t>Phase C</a:t>
+            </a:r>
+            <a:endParaRPr lang="en-US" dirty="0"/>
+          </a:p>
+        </p:txBody>
+      </p:sp>
     </p:spTree>
     <p:extLst>
       <p:ext uri="{BB962C8B-B14F-4D97-AF65-F5344CB8AC3E}">
@@ -5607,6 +5723,87 @@
 </file>
 
 <file path=ppt/slides/slide3.xml><?xml version="1.0" encoding="utf-8"?>
+<p:sld xmlns:a="http://schemas.openxmlformats.org/drawingml/2006/main" xmlns:r="http://schemas.openxmlformats.org/officeDocument/2006/relationships" xmlns:p="http://schemas.openxmlformats.org/presentationml/2006/main">
+  <p:cSld>
+    <p:spTree>
+      <p:nvGrpSpPr>
+        <p:cNvPr id="1" name=""/>
+        <p:cNvGrpSpPr/>
+        <p:nvPr/>
+      </p:nvGrpSpPr>
+      <p:grpSpPr>
+        <a:xfrm>
+          <a:off x="0" y="0"/>
+          <a:ext cx="0" cy="0"/>
+          <a:chOff x="0" y="0"/>
+          <a:chExt cx="0" cy="0"/>
+        </a:xfrm>
+      </p:grpSpPr>
+      <p:sp>
+        <p:nvSpPr>
+          <p:cNvPr id="4" name="3 Elipse"/>
+          <p:cNvSpPr/>
+          <p:nvPr/>
+        </p:nvSpPr>
+        <p:spPr>
+          <a:xfrm>
+            <a:off x="228600" y="152400"/>
+            <a:ext cx="762000" cy="457200"/>
+          </a:xfrm>
+          <a:prstGeom prst="ellipse">
+            <a:avLst/>
+          </a:prstGeom>
+        </p:spPr>
+        <p:style>
+          <a:lnRef idx="2">
+            <a:schemeClr val="accent1">
+              <a:shade val="50000"/>
+            </a:schemeClr>
+          </a:lnRef>
+          <a:fillRef idx="1">
+            <a:schemeClr val="accent1"/>
+          </a:fillRef>
+          <a:effectRef idx="0">
+            <a:schemeClr val="accent1"/>
+          </a:effectRef>
+          <a:fontRef idx="minor">
+            <a:schemeClr val="lt1"/>
+          </a:fontRef>
+        </p:style>
+        <p:txBody>
+          <a:bodyPr rtlCol="0" anchor="ctr"/>
+          <a:lstStyle/>
+          <a:p>
+            <a:pPr algn="ctr"/>
+            <a:r>
+              <a:rPr lang="en-US" sz="1200" dirty="0" smtClean="0"/>
+              <a:t>start</a:t>
+            </a:r>
+            <a:endParaRPr lang="en-US" sz="1200" dirty="0"/>
+          </a:p>
+        </p:txBody>
+      </p:sp>
+    </p:spTree>
+    <p:extLst>
+      <p:ext uri="{BB962C8B-B14F-4D97-AF65-F5344CB8AC3E}">
+        <p14:creationId xmlns:p14="http://schemas.microsoft.com/office/powerpoint/2010/main" val="2316059204"/>
+      </p:ext>
+    </p:extLst>
+  </p:cSld>
+  <p:clrMapOvr>
+    <a:masterClrMapping/>
+  </p:clrMapOvr>
+  <p:timing>
+    <p:tnLst>
+      <p:par>
+        <p:cTn id="1" dur="indefinite" restart="never" nodeType="tmRoot"/>
+      </p:par>
+    </p:tnLst>
+  </p:timing>
+</p:sld>
+</file>
+
+<file path=ppt/slides/slide4.xml><?xml version="1.0" encoding="utf-8"?>
 <p:sld xmlns:a="http://schemas.openxmlformats.org/drawingml/2006/main" xmlns:r="http://schemas.openxmlformats.org/officeDocument/2006/relationships" xmlns:p="http://schemas.openxmlformats.org/presentationml/2006/main">
   <p:cSld>
     <p:spTree>

</xml_diff>